<commit_message>
#iss4 : update .docs and .pptx
</commit_message>
<xml_diff>
--- a/BaoCao.pptx
+++ b/BaoCao.pptx
@@ -624,7 +624,7 @@
           <p:cNvPr id="16386" name="Rectangle 2">
             <a:extLst>
               <a:ext uri="{FF2B5EF4-FFF2-40B4-BE49-F238E27FC236}">
-                <a16:creationId xmlns="" xmlns:a16="http://schemas.microsoft.com/office/drawing/2014/main" id="{12716CEC-4EB7-4AF5-B8B4-13A4AA74F184}"/>
+                <a16:creationId xmlns:a16="http://schemas.microsoft.com/office/drawing/2014/main" xmlns="" id="{12716CEC-4EB7-4AF5-B8B4-13A4AA74F184}"/>
               </a:ext>
             </a:extLst>
           </p:cNvPr>
@@ -662,7 +662,7 @@
           <p:cNvPr id="16387" name="Rectangle 3">
             <a:extLst>
               <a:ext uri="{FF2B5EF4-FFF2-40B4-BE49-F238E27FC236}">
-                <a16:creationId xmlns="" xmlns:a16="http://schemas.microsoft.com/office/drawing/2014/main" id="{7A8B1175-CAAE-4DE1-9BCE-EE12E1548589}"/>
+                <a16:creationId xmlns:a16="http://schemas.microsoft.com/office/drawing/2014/main" xmlns="" id="{7A8B1175-CAAE-4DE1-9BCE-EE12E1548589}"/>
               </a:ext>
             </a:extLst>
           </p:cNvPr>
@@ -702,7 +702,7 @@
           <p:cNvPr id="16388" name="Rectangle 4">
             <a:extLst>
               <a:ext uri="{FF2B5EF4-FFF2-40B4-BE49-F238E27FC236}">
-                <a16:creationId xmlns="" xmlns:a16="http://schemas.microsoft.com/office/drawing/2014/main" id="{4EFCFD27-3C59-440E-9355-8E61DE9E9F61}"/>
+                <a16:creationId xmlns:a16="http://schemas.microsoft.com/office/drawing/2014/main" xmlns="" id="{4EFCFD27-3C59-440E-9355-8E61DE9E9F61}"/>
               </a:ext>
             </a:extLst>
           </p:cNvPr>
@@ -736,7 +736,7 @@
           <p:cNvPr id="16389" name="Rectangle 5">
             <a:extLst>
               <a:ext uri="{FF2B5EF4-FFF2-40B4-BE49-F238E27FC236}">
-                <a16:creationId xmlns="" xmlns:a16="http://schemas.microsoft.com/office/drawing/2014/main" id="{18A37AE1-76EA-4F7C-89AE-6531C0C56B99}"/>
+                <a16:creationId xmlns:a16="http://schemas.microsoft.com/office/drawing/2014/main" xmlns="" id="{18A37AE1-76EA-4F7C-89AE-6531C0C56B99}"/>
               </a:ext>
             </a:extLst>
           </p:cNvPr>
@@ -770,7 +770,7 @@
           <p:cNvPr id="16390" name="Rectangle 6">
             <a:extLst>
               <a:ext uri="{FF2B5EF4-FFF2-40B4-BE49-F238E27FC236}">
-                <a16:creationId xmlns="" xmlns:a16="http://schemas.microsoft.com/office/drawing/2014/main" id="{E348B9C2-253F-43BD-BBE7-0B49698116D7}"/>
+                <a16:creationId xmlns:a16="http://schemas.microsoft.com/office/drawing/2014/main" xmlns="" id="{E348B9C2-253F-43BD-BBE7-0B49698116D7}"/>
               </a:ext>
             </a:extLst>
           </p:cNvPr>
@@ -834,7 +834,7 @@
           <p:cNvPr id="2" name="Title 1">
             <a:extLst>
               <a:ext uri="{FF2B5EF4-FFF2-40B4-BE49-F238E27FC236}">
-                <a16:creationId xmlns="" xmlns:a16="http://schemas.microsoft.com/office/drawing/2014/main" id="{EE822BBF-5276-4192-BA57-B0752687F9A4}"/>
+                <a16:creationId xmlns:a16="http://schemas.microsoft.com/office/drawing/2014/main" xmlns="" id="{EE822BBF-5276-4192-BA57-B0752687F9A4}"/>
               </a:ext>
             </a:extLst>
           </p:cNvPr>
@@ -862,7 +862,7 @@
           <p:cNvPr id="3" name="Vertical Text Placeholder 2">
             <a:extLst>
               <a:ext uri="{FF2B5EF4-FFF2-40B4-BE49-F238E27FC236}">
-                <a16:creationId xmlns="" xmlns:a16="http://schemas.microsoft.com/office/drawing/2014/main" id="{EB8C078B-EB7B-44AD-A4C2-B8DC31D9B6F6}"/>
+                <a16:creationId xmlns:a16="http://schemas.microsoft.com/office/drawing/2014/main" xmlns="" id="{EB8C078B-EB7B-44AD-A4C2-B8DC31D9B6F6}"/>
               </a:ext>
             </a:extLst>
           </p:cNvPr>
@@ -919,7 +919,7 @@
           <p:cNvPr id="4" name="Date Placeholder 3">
             <a:extLst>
               <a:ext uri="{FF2B5EF4-FFF2-40B4-BE49-F238E27FC236}">
-                <a16:creationId xmlns="" xmlns:a16="http://schemas.microsoft.com/office/drawing/2014/main" id="{BD07DE7E-9122-41D3-A66E-3CDCBCE9C20E}"/>
+                <a16:creationId xmlns:a16="http://schemas.microsoft.com/office/drawing/2014/main" xmlns="" id="{BD07DE7E-9122-41D3-A66E-3CDCBCE9C20E}"/>
               </a:ext>
             </a:extLst>
           </p:cNvPr>
@@ -948,7 +948,7 @@
           <p:cNvPr id="5" name="Footer Placeholder 4">
             <a:extLst>
               <a:ext uri="{FF2B5EF4-FFF2-40B4-BE49-F238E27FC236}">
-                <a16:creationId xmlns="" xmlns:a16="http://schemas.microsoft.com/office/drawing/2014/main" id="{6AF65EA4-62DF-493C-B19B-64550981D578}"/>
+                <a16:creationId xmlns:a16="http://schemas.microsoft.com/office/drawing/2014/main" xmlns="" id="{6AF65EA4-62DF-493C-B19B-64550981D578}"/>
               </a:ext>
             </a:extLst>
           </p:cNvPr>
@@ -977,7 +977,7 @@
           <p:cNvPr id="6" name="Slide Number Placeholder 5">
             <a:extLst>
               <a:ext uri="{FF2B5EF4-FFF2-40B4-BE49-F238E27FC236}">
-                <a16:creationId xmlns="" xmlns:a16="http://schemas.microsoft.com/office/drawing/2014/main" id="{564301BB-D36E-4AE2-BE8A-E50EB27CA2B1}"/>
+                <a16:creationId xmlns:a16="http://schemas.microsoft.com/office/drawing/2014/main" xmlns="" id="{564301BB-D36E-4AE2-BE8A-E50EB27CA2B1}"/>
               </a:ext>
             </a:extLst>
           </p:cNvPr>
@@ -1041,7 +1041,7 @@
           <p:cNvPr id="2" name="Vertical Title 1">
             <a:extLst>
               <a:ext uri="{FF2B5EF4-FFF2-40B4-BE49-F238E27FC236}">
-                <a16:creationId xmlns="" xmlns:a16="http://schemas.microsoft.com/office/drawing/2014/main" id="{C55C4325-1A15-4599-B036-9FA60518A530}"/>
+                <a16:creationId xmlns:a16="http://schemas.microsoft.com/office/drawing/2014/main" xmlns="" id="{C55C4325-1A15-4599-B036-9FA60518A530}"/>
               </a:ext>
             </a:extLst>
           </p:cNvPr>
@@ -1074,7 +1074,7 @@
           <p:cNvPr id="3" name="Vertical Text Placeholder 2">
             <a:extLst>
               <a:ext uri="{FF2B5EF4-FFF2-40B4-BE49-F238E27FC236}">
-                <a16:creationId xmlns="" xmlns:a16="http://schemas.microsoft.com/office/drawing/2014/main" id="{5792199C-8BFD-4358-9055-518928EAE0B9}"/>
+                <a16:creationId xmlns:a16="http://schemas.microsoft.com/office/drawing/2014/main" xmlns="" id="{5792199C-8BFD-4358-9055-518928EAE0B9}"/>
               </a:ext>
             </a:extLst>
           </p:cNvPr>
@@ -1136,7 +1136,7 @@
           <p:cNvPr id="4" name="Date Placeholder 3">
             <a:extLst>
               <a:ext uri="{FF2B5EF4-FFF2-40B4-BE49-F238E27FC236}">
-                <a16:creationId xmlns="" xmlns:a16="http://schemas.microsoft.com/office/drawing/2014/main" id="{5B64E68E-040F-4912-9B7B-725CFB7D6315}"/>
+                <a16:creationId xmlns:a16="http://schemas.microsoft.com/office/drawing/2014/main" xmlns="" id="{5B64E68E-040F-4912-9B7B-725CFB7D6315}"/>
               </a:ext>
             </a:extLst>
           </p:cNvPr>
@@ -1165,7 +1165,7 @@
           <p:cNvPr id="5" name="Footer Placeholder 4">
             <a:extLst>
               <a:ext uri="{FF2B5EF4-FFF2-40B4-BE49-F238E27FC236}">
-                <a16:creationId xmlns="" xmlns:a16="http://schemas.microsoft.com/office/drawing/2014/main" id="{0D139E95-5F5B-4E87-9B2F-A9A70957AB00}"/>
+                <a16:creationId xmlns:a16="http://schemas.microsoft.com/office/drawing/2014/main" xmlns="" id="{0D139E95-5F5B-4E87-9B2F-A9A70957AB00}"/>
               </a:ext>
             </a:extLst>
           </p:cNvPr>
@@ -1194,7 +1194,7 @@
           <p:cNvPr id="6" name="Slide Number Placeholder 5">
             <a:extLst>
               <a:ext uri="{FF2B5EF4-FFF2-40B4-BE49-F238E27FC236}">
-                <a16:creationId xmlns="" xmlns:a16="http://schemas.microsoft.com/office/drawing/2014/main" id="{9C4FE7F3-EC17-415F-863D-DF17690ED1C0}"/>
+                <a16:creationId xmlns:a16="http://schemas.microsoft.com/office/drawing/2014/main" xmlns="" id="{9C4FE7F3-EC17-415F-863D-DF17690ED1C0}"/>
               </a:ext>
             </a:extLst>
           </p:cNvPr>
@@ -1258,7 +1258,7 @@
           <p:cNvPr id="2" name="Title 1">
             <a:extLst>
               <a:ext uri="{FF2B5EF4-FFF2-40B4-BE49-F238E27FC236}">
-                <a16:creationId xmlns="" xmlns:a16="http://schemas.microsoft.com/office/drawing/2014/main" id="{9AB7FED8-62E4-44F9-8635-073E7D21D9FD}"/>
+                <a16:creationId xmlns:a16="http://schemas.microsoft.com/office/drawing/2014/main" xmlns="" id="{9AB7FED8-62E4-44F9-8635-073E7D21D9FD}"/>
               </a:ext>
             </a:extLst>
           </p:cNvPr>
@@ -1286,7 +1286,7 @@
           <p:cNvPr id="3" name="Content Placeholder 2">
             <a:extLst>
               <a:ext uri="{FF2B5EF4-FFF2-40B4-BE49-F238E27FC236}">
-                <a16:creationId xmlns="" xmlns:a16="http://schemas.microsoft.com/office/drawing/2014/main" id="{804BF88E-6176-40DB-A4F0-5F9D10D14F4A}"/>
+                <a16:creationId xmlns:a16="http://schemas.microsoft.com/office/drawing/2014/main" xmlns="" id="{804BF88E-6176-40DB-A4F0-5F9D10D14F4A}"/>
               </a:ext>
             </a:extLst>
           </p:cNvPr>
@@ -1343,7 +1343,7 @@
           <p:cNvPr id="4" name="Date Placeholder 3">
             <a:extLst>
               <a:ext uri="{FF2B5EF4-FFF2-40B4-BE49-F238E27FC236}">
-                <a16:creationId xmlns="" xmlns:a16="http://schemas.microsoft.com/office/drawing/2014/main" id="{07CD7C81-1B47-4037-B98B-75A1F4012D7D}"/>
+                <a16:creationId xmlns:a16="http://schemas.microsoft.com/office/drawing/2014/main" xmlns="" id="{07CD7C81-1B47-4037-B98B-75A1F4012D7D}"/>
               </a:ext>
             </a:extLst>
           </p:cNvPr>
@@ -1372,7 +1372,7 @@
           <p:cNvPr id="5" name="Footer Placeholder 4">
             <a:extLst>
               <a:ext uri="{FF2B5EF4-FFF2-40B4-BE49-F238E27FC236}">
-                <a16:creationId xmlns="" xmlns:a16="http://schemas.microsoft.com/office/drawing/2014/main" id="{615C4BD4-42E2-497A-AD54-B10928A49073}"/>
+                <a16:creationId xmlns:a16="http://schemas.microsoft.com/office/drawing/2014/main" xmlns="" id="{615C4BD4-42E2-497A-AD54-B10928A49073}"/>
               </a:ext>
             </a:extLst>
           </p:cNvPr>
@@ -1401,7 +1401,7 @@
           <p:cNvPr id="6" name="Slide Number Placeholder 5">
             <a:extLst>
               <a:ext uri="{FF2B5EF4-FFF2-40B4-BE49-F238E27FC236}">
-                <a16:creationId xmlns="" xmlns:a16="http://schemas.microsoft.com/office/drawing/2014/main" id="{C2C080A8-4B04-4A76-AD9D-D3373B2CDFD7}"/>
+                <a16:creationId xmlns:a16="http://schemas.microsoft.com/office/drawing/2014/main" xmlns="" id="{C2C080A8-4B04-4A76-AD9D-D3373B2CDFD7}"/>
               </a:ext>
             </a:extLst>
           </p:cNvPr>
@@ -1465,7 +1465,7 @@
           <p:cNvPr id="2" name="Title 1">
             <a:extLst>
               <a:ext uri="{FF2B5EF4-FFF2-40B4-BE49-F238E27FC236}">
-                <a16:creationId xmlns="" xmlns:a16="http://schemas.microsoft.com/office/drawing/2014/main" id="{A09CE863-2F38-493E-AC5F-35F839ABEA4D}"/>
+                <a16:creationId xmlns:a16="http://schemas.microsoft.com/office/drawing/2014/main" xmlns="" id="{A09CE863-2F38-493E-AC5F-35F839ABEA4D}"/>
               </a:ext>
             </a:extLst>
           </p:cNvPr>
@@ -1502,7 +1502,7 @@
           <p:cNvPr id="3" name="Text Placeholder 2">
             <a:extLst>
               <a:ext uri="{FF2B5EF4-FFF2-40B4-BE49-F238E27FC236}">
-                <a16:creationId xmlns="" xmlns:a16="http://schemas.microsoft.com/office/drawing/2014/main" id="{EE71EE57-4E33-4768-BDE6-1E42E78CC47E}"/>
+                <a16:creationId xmlns:a16="http://schemas.microsoft.com/office/drawing/2014/main" xmlns="" id="{EE71EE57-4E33-4768-BDE6-1E42E78CC47E}"/>
               </a:ext>
             </a:extLst>
           </p:cNvPr>
@@ -1573,7 +1573,7 @@
           <p:cNvPr id="4" name="Date Placeholder 3">
             <a:extLst>
               <a:ext uri="{FF2B5EF4-FFF2-40B4-BE49-F238E27FC236}">
-                <a16:creationId xmlns="" xmlns:a16="http://schemas.microsoft.com/office/drawing/2014/main" id="{71F47056-25E1-4B67-85BD-73087B72E971}"/>
+                <a16:creationId xmlns:a16="http://schemas.microsoft.com/office/drawing/2014/main" xmlns="" id="{71F47056-25E1-4B67-85BD-73087B72E971}"/>
               </a:ext>
             </a:extLst>
           </p:cNvPr>
@@ -1602,7 +1602,7 @@
           <p:cNvPr id="5" name="Footer Placeholder 4">
             <a:extLst>
               <a:ext uri="{FF2B5EF4-FFF2-40B4-BE49-F238E27FC236}">
-                <a16:creationId xmlns="" xmlns:a16="http://schemas.microsoft.com/office/drawing/2014/main" id="{F94B0AFD-04FE-4D58-8BBC-B3312F4708EF}"/>
+                <a16:creationId xmlns:a16="http://schemas.microsoft.com/office/drawing/2014/main" xmlns="" id="{F94B0AFD-04FE-4D58-8BBC-B3312F4708EF}"/>
               </a:ext>
             </a:extLst>
           </p:cNvPr>
@@ -1631,7 +1631,7 @@
           <p:cNvPr id="6" name="Slide Number Placeholder 5">
             <a:extLst>
               <a:ext uri="{FF2B5EF4-FFF2-40B4-BE49-F238E27FC236}">
-                <a16:creationId xmlns="" xmlns:a16="http://schemas.microsoft.com/office/drawing/2014/main" id="{8640AEAA-EABC-4389-89FD-1194EAE5C62C}"/>
+                <a16:creationId xmlns:a16="http://schemas.microsoft.com/office/drawing/2014/main" xmlns="" id="{8640AEAA-EABC-4389-89FD-1194EAE5C62C}"/>
               </a:ext>
             </a:extLst>
           </p:cNvPr>
@@ -1695,7 +1695,7 @@
           <p:cNvPr id="2" name="Title 1">
             <a:extLst>
               <a:ext uri="{FF2B5EF4-FFF2-40B4-BE49-F238E27FC236}">
-                <a16:creationId xmlns="" xmlns:a16="http://schemas.microsoft.com/office/drawing/2014/main" id="{79BE3C47-6B83-4D40-8FFA-423CDED83F11}"/>
+                <a16:creationId xmlns:a16="http://schemas.microsoft.com/office/drawing/2014/main" xmlns="" id="{79BE3C47-6B83-4D40-8FFA-423CDED83F11}"/>
               </a:ext>
             </a:extLst>
           </p:cNvPr>
@@ -1723,7 +1723,7 @@
           <p:cNvPr id="3" name="Content Placeholder 2">
             <a:extLst>
               <a:ext uri="{FF2B5EF4-FFF2-40B4-BE49-F238E27FC236}">
-                <a16:creationId xmlns="" xmlns:a16="http://schemas.microsoft.com/office/drawing/2014/main" id="{455CE053-7F00-4D26-A49E-468074BDA09E}"/>
+                <a16:creationId xmlns:a16="http://schemas.microsoft.com/office/drawing/2014/main" xmlns="" id="{455CE053-7F00-4D26-A49E-468074BDA09E}"/>
               </a:ext>
             </a:extLst>
           </p:cNvPr>
@@ -1785,7 +1785,7 @@
           <p:cNvPr id="4" name="Content Placeholder 3">
             <a:extLst>
               <a:ext uri="{FF2B5EF4-FFF2-40B4-BE49-F238E27FC236}">
-                <a16:creationId xmlns="" xmlns:a16="http://schemas.microsoft.com/office/drawing/2014/main" id="{C77BA0AC-734F-47AA-97FD-4DA7FEF918C4}"/>
+                <a16:creationId xmlns:a16="http://schemas.microsoft.com/office/drawing/2014/main" xmlns="" id="{C77BA0AC-734F-47AA-97FD-4DA7FEF918C4}"/>
               </a:ext>
             </a:extLst>
           </p:cNvPr>
@@ -1847,7 +1847,7 @@
           <p:cNvPr id="5" name="Date Placeholder 4">
             <a:extLst>
               <a:ext uri="{FF2B5EF4-FFF2-40B4-BE49-F238E27FC236}">
-                <a16:creationId xmlns="" xmlns:a16="http://schemas.microsoft.com/office/drawing/2014/main" id="{A4211179-6CFA-425B-9D7F-2BE02065447E}"/>
+                <a16:creationId xmlns:a16="http://schemas.microsoft.com/office/drawing/2014/main" xmlns="" id="{A4211179-6CFA-425B-9D7F-2BE02065447E}"/>
               </a:ext>
             </a:extLst>
           </p:cNvPr>
@@ -1876,7 +1876,7 @@
           <p:cNvPr id="6" name="Footer Placeholder 5">
             <a:extLst>
               <a:ext uri="{FF2B5EF4-FFF2-40B4-BE49-F238E27FC236}">
-                <a16:creationId xmlns="" xmlns:a16="http://schemas.microsoft.com/office/drawing/2014/main" id="{AA6E626E-637B-499E-9E2C-ACC64C09C73D}"/>
+                <a16:creationId xmlns:a16="http://schemas.microsoft.com/office/drawing/2014/main" xmlns="" id="{AA6E626E-637B-499E-9E2C-ACC64C09C73D}"/>
               </a:ext>
             </a:extLst>
           </p:cNvPr>
@@ -1905,7 +1905,7 @@
           <p:cNvPr id="7" name="Slide Number Placeholder 6">
             <a:extLst>
               <a:ext uri="{FF2B5EF4-FFF2-40B4-BE49-F238E27FC236}">
-                <a16:creationId xmlns="" xmlns:a16="http://schemas.microsoft.com/office/drawing/2014/main" id="{8177475E-6A5C-42A5-8A22-584439427149}"/>
+                <a16:creationId xmlns:a16="http://schemas.microsoft.com/office/drawing/2014/main" xmlns="" id="{8177475E-6A5C-42A5-8A22-584439427149}"/>
               </a:ext>
             </a:extLst>
           </p:cNvPr>
@@ -1969,7 +1969,7 @@
           <p:cNvPr id="2" name="Title 1">
             <a:extLst>
               <a:ext uri="{FF2B5EF4-FFF2-40B4-BE49-F238E27FC236}">
-                <a16:creationId xmlns="" xmlns:a16="http://schemas.microsoft.com/office/drawing/2014/main" id="{26D1F325-80E3-4F90-BD69-5037DB90DF26}"/>
+                <a16:creationId xmlns:a16="http://schemas.microsoft.com/office/drawing/2014/main" xmlns="" id="{26D1F325-80E3-4F90-BD69-5037DB90DF26}"/>
               </a:ext>
             </a:extLst>
           </p:cNvPr>
@@ -2002,7 +2002,7 @@
           <p:cNvPr id="3" name="Text Placeholder 2">
             <a:extLst>
               <a:ext uri="{FF2B5EF4-FFF2-40B4-BE49-F238E27FC236}">
-                <a16:creationId xmlns="" xmlns:a16="http://schemas.microsoft.com/office/drawing/2014/main" id="{16DC193B-2F0E-4826-9109-B6307A9C06F1}"/>
+                <a16:creationId xmlns:a16="http://schemas.microsoft.com/office/drawing/2014/main" xmlns="" id="{16DC193B-2F0E-4826-9109-B6307A9C06F1}"/>
               </a:ext>
             </a:extLst>
           </p:cNvPr>
@@ -2073,7 +2073,7 @@
           <p:cNvPr id="4" name="Content Placeholder 3">
             <a:extLst>
               <a:ext uri="{FF2B5EF4-FFF2-40B4-BE49-F238E27FC236}">
-                <a16:creationId xmlns="" xmlns:a16="http://schemas.microsoft.com/office/drawing/2014/main" id="{E4A24B64-B380-470F-9CDE-73C0D43F6775}"/>
+                <a16:creationId xmlns:a16="http://schemas.microsoft.com/office/drawing/2014/main" xmlns="" id="{E4A24B64-B380-470F-9CDE-73C0D43F6775}"/>
               </a:ext>
             </a:extLst>
           </p:cNvPr>
@@ -2135,7 +2135,7 @@
           <p:cNvPr id="5" name="Text Placeholder 4">
             <a:extLst>
               <a:ext uri="{FF2B5EF4-FFF2-40B4-BE49-F238E27FC236}">
-                <a16:creationId xmlns="" xmlns:a16="http://schemas.microsoft.com/office/drawing/2014/main" id="{8890F4E0-0F61-4F55-8A7A-765984DF7865}"/>
+                <a16:creationId xmlns:a16="http://schemas.microsoft.com/office/drawing/2014/main" xmlns="" id="{8890F4E0-0F61-4F55-8A7A-765984DF7865}"/>
               </a:ext>
             </a:extLst>
           </p:cNvPr>
@@ -2206,7 +2206,7 @@
           <p:cNvPr id="6" name="Content Placeholder 5">
             <a:extLst>
               <a:ext uri="{FF2B5EF4-FFF2-40B4-BE49-F238E27FC236}">
-                <a16:creationId xmlns="" xmlns:a16="http://schemas.microsoft.com/office/drawing/2014/main" id="{9895C38B-8A04-4272-A3E6-393D95555544}"/>
+                <a16:creationId xmlns:a16="http://schemas.microsoft.com/office/drawing/2014/main" xmlns="" id="{9895C38B-8A04-4272-A3E6-393D95555544}"/>
               </a:ext>
             </a:extLst>
           </p:cNvPr>
@@ -2268,7 +2268,7 @@
           <p:cNvPr id="7" name="Date Placeholder 6">
             <a:extLst>
               <a:ext uri="{FF2B5EF4-FFF2-40B4-BE49-F238E27FC236}">
-                <a16:creationId xmlns="" xmlns:a16="http://schemas.microsoft.com/office/drawing/2014/main" id="{B46373DA-5867-4829-AD43-C6FCC79A803E}"/>
+                <a16:creationId xmlns:a16="http://schemas.microsoft.com/office/drawing/2014/main" xmlns="" id="{B46373DA-5867-4829-AD43-C6FCC79A803E}"/>
               </a:ext>
             </a:extLst>
           </p:cNvPr>
@@ -2297,7 +2297,7 @@
           <p:cNvPr id="8" name="Footer Placeholder 7">
             <a:extLst>
               <a:ext uri="{FF2B5EF4-FFF2-40B4-BE49-F238E27FC236}">
-                <a16:creationId xmlns="" xmlns:a16="http://schemas.microsoft.com/office/drawing/2014/main" id="{021764FC-FDFA-416E-997C-F691587D4AF2}"/>
+                <a16:creationId xmlns:a16="http://schemas.microsoft.com/office/drawing/2014/main" xmlns="" id="{021764FC-FDFA-416E-997C-F691587D4AF2}"/>
               </a:ext>
             </a:extLst>
           </p:cNvPr>
@@ -2326,7 +2326,7 @@
           <p:cNvPr id="9" name="Slide Number Placeholder 8">
             <a:extLst>
               <a:ext uri="{FF2B5EF4-FFF2-40B4-BE49-F238E27FC236}">
-                <a16:creationId xmlns="" xmlns:a16="http://schemas.microsoft.com/office/drawing/2014/main" id="{27E741E6-72FD-4F69-97E8-CAC734DCE79A}"/>
+                <a16:creationId xmlns:a16="http://schemas.microsoft.com/office/drawing/2014/main" xmlns="" id="{27E741E6-72FD-4F69-97E8-CAC734DCE79A}"/>
               </a:ext>
             </a:extLst>
           </p:cNvPr>
@@ -2390,7 +2390,7 @@
           <p:cNvPr id="2" name="Title 1">
             <a:extLst>
               <a:ext uri="{FF2B5EF4-FFF2-40B4-BE49-F238E27FC236}">
-                <a16:creationId xmlns="" xmlns:a16="http://schemas.microsoft.com/office/drawing/2014/main" id="{0E52B71A-EE87-467A-AD67-4ECCFB0E52E9}"/>
+                <a16:creationId xmlns:a16="http://schemas.microsoft.com/office/drawing/2014/main" xmlns="" id="{0E52B71A-EE87-467A-AD67-4ECCFB0E52E9}"/>
               </a:ext>
             </a:extLst>
           </p:cNvPr>
@@ -2418,7 +2418,7 @@
           <p:cNvPr id="3" name="Date Placeholder 2">
             <a:extLst>
               <a:ext uri="{FF2B5EF4-FFF2-40B4-BE49-F238E27FC236}">
-                <a16:creationId xmlns="" xmlns:a16="http://schemas.microsoft.com/office/drawing/2014/main" id="{5D6EB2EF-2DBC-41CB-8232-B6E49BCBA6FA}"/>
+                <a16:creationId xmlns:a16="http://schemas.microsoft.com/office/drawing/2014/main" xmlns="" id="{5D6EB2EF-2DBC-41CB-8232-B6E49BCBA6FA}"/>
               </a:ext>
             </a:extLst>
           </p:cNvPr>
@@ -2447,7 +2447,7 @@
           <p:cNvPr id="4" name="Footer Placeholder 3">
             <a:extLst>
               <a:ext uri="{FF2B5EF4-FFF2-40B4-BE49-F238E27FC236}">
-                <a16:creationId xmlns="" xmlns:a16="http://schemas.microsoft.com/office/drawing/2014/main" id="{EA583847-6C7C-4715-98B9-D40636DA2722}"/>
+                <a16:creationId xmlns:a16="http://schemas.microsoft.com/office/drawing/2014/main" xmlns="" id="{EA583847-6C7C-4715-98B9-D40636DA2722}"/>
               </a:ext>
             </a:extLst>
           </p:cNvPr>
@@ -2476,7 +2476,7 @@
           <p:cNvPr id="5" name="Slide Number Placeholder 4">
             <a:extLst>
               <a:ext uri="{FF2B5EF4-FFF2-40B4-BE49-F238E27FC236}">
-                <a16:creationId xmlns="" xmlns:a16="http://schemas.microsoft.com/office/drawing/2014/main" id="{5F0D5148-3F8F-464B-A3E1-5F680B454153}"/>
+                <a16:creationId xmlns:a16="http://schemas.microsoft.com/office/drawing/2014/main" xmlns="" id="{5F0D5148-3F8F-464B-A3E1-5F680B454153}"/>
               </a:ext>
             </a:extLst>
           </p:cNvPr>
@@ -2540,7 +2540,7 @@
           <p:cNvPr id="2" name="Date Placeholder 1">
             <a:extLst>
               <a:ext uri="{FF2B5EF4-FFF2-40B4-BE49-F238E27FC236}">
-                <a16:creationId xmlns="" xmlns:a16="http://schemas.microsoft.com/office/drawing/2014/main" id="{B70D4DB3-3677-453C-AD63-255313C4E429}"/>
+                <a16:creationId xmlns:a16="http://schemas.microsoft.com/office/drawing/2014/main" xmlns="" id="{B70D4DB3-3677-453C-AD63-255313C4E429}"/>
               </a:ext>
             </a:extLst>
           </p:cNvPr>
@@ -2569,7 +2569,7 @@
           <p:cNvPr id="3" name="Footer Placeholder 2">
             <a:extLst>
               <a:ext uri="{FF2B5EF4-FFF2-40B4-BE49-F238E27FC236}">
-                <a16:creationId xmlns="" xmlns:a16="http://schemas.microsoft.com/office/drawing/2014/main" id="{991E578C-2E20-4473-943A-093C5C3141E8}"/>
+                <a16:creationId xmlns:a16="http://schemas.microsoft.com/office/drawing/2014/main" xmlns="" id="{991E578C-2E20-4473-943A-093C5C3141E8}"/>
               </a:ext>
             </a:extLst>
           </p:cNvPr>
@@ -2598,7 +2598,7 @@
           <p:cNvPr id="4" name="Slide Number Placeholder 3">
             <a:extLst>
               <a:ext uri="{FF2B5EF4-FFF2-40B4-BE49-F238E27FC236}">
-                <a16:creationId xmlns="" xmlns:a16="http://schemas.microsoft.com/office/drawing/2014/main" id="{FA3681F5-37CC-4FFE-98C1-BDE69E1382C8}"/>
+                <a16:creationId xmlns:a16="http://schemas.microsoft.com/office/drawing/2014/main" xmlns="" id="{FA3681F5-37CC-4FFE-98C1-BDE69E1382C8}"/>
               </a:ext>
             </a:extLst>
           </p:cNvPr>
@@ -2662,7 +2662,7 @@
           <p:cNvPr id="2" name="Title 1">
             <a:extLst>
               <a:ext uri="{FF2B5EF4-FFF2-40B4-BE49-F238E27FC236}">
-                <a16:creationId xmlns="" xmlns:a16="http://schemas.microsoft.com/office/drawing/2014/main" id="{27E10611-3704-4861-BD88-F503F43FAF86}"/>
+                <a16:creationId xmlns:a16="http://schemas.microsoft.com/office/drawing/2014/main" xmlns="" id="{27E10611-3704-4861-BD88-F503F43FAF86}"/>
               </a:ext>
             </a:extLst>
           </p:cNvPr>
@@ -2699,7 +2699,7 @@
           <p:cNvPr id="3" name="Content Placeholder 2">
             <a:extLst>
               <a:ext uri="{FF2B5EF4-FFF2-40B4-BE49-F238E27FC236}">
-                <a16:creationId xmlns="" xmlns:a16="http://schemas.microsoft.com/office/drawing/2014/main" id="{B9DB25AB-F178-4E56-A78A-D3E5D8B2D9E0}"/>
+                <a16:creationId xmlns:a16="http://schemas.microsoft.com/office/drawing/2014/main" xmlns="" id="{B9DB25AB-F178-4E56-A78A-D3E5D8B2D9E0}"/>
               </a:ext>
             </a:extLst>
           </p:cNvPr>
@@ -2789,7 +2789,7 @@
           <p:cNvPr id="4" name="Text Placeholder 3">
             <a:extLst>
               <a:ext uri="{FF2B5EF4-FFF2-40B4-BE49-F238E27FC236}">
-                <a16:creationId xmlns="" xmlns:a16="http://schemas.microsoft.com/office/drawing/2014/main" id="{2D8C3404-B5CD-41A1-BD0C-CEB1CDB87330}"/>
+                <a16:creationId xmlns:a16="http://schemas.microsoft.com/office/drawing/2014/main" xmlns="" id="{2D8C3404-B5CD-41A1-BD0C-CEB1CDB87330}"/>
               </a:ext>
             </a:extLst>
           </p:cNvPr>
@@ -2860,7 +2860,7 @@
           <p:cNvPr id="5" name="Date Placeholder 4">
             <a:extLst>
               <a:ext uri="{FF2B5EF4-FFF2-40B4-BE49-F238E27FC236}">
-                <a16:creationId xmlns="" xmlns:a16="http://schemas.microsoft.com/office/drawing/2014/main" id="{18903B3B-2157-4986-A6D1-D21E38C81562}"/>
+                <a16:creationId xmlns:a16="http://schemas.microsoft.com/office/drawing/2014/main" xmlns="" id="{18903B3B-2157-4986-A6D1-D21E38C81562}"/>
               </a:ext>
             </a:extLst>
           </p:cNvPr>
@@ -2889,7 +2889,7 @@
           <p:cNvPr id="6" name="Footer Placeholder 5">
             <a:extLst>
               <a:ext uri="{FF2B5EF4-FFF2-40B4-BE49-F238E27FC236}">
-                <a16:creationId xmlns="" xmlns:a16="http://schemas.microsoft.com/office/drawing/2014/main" id="{9A6720C0-253D-4EFB-8A0E-096A4FC7527B}"/>
+                <a16:creationId xmlns:a16="http://schemas.microsoft.com/office/drawing/2014/main" xmlns="" id="{9A6720C0-253D-4EFB-8A0E-096A4FC7527B}"/>
               </a:ext>
             </a:extLst>
           </p:cNvPr>
@@ -2918,7 +2918,7 @@
           <p:cNvPr id="7" name="Slide Number Placeholder 6">
             <a:extLst>
               <a:ext uri="{FF2B5EF4-FFF2-40B4-BE49-F238E27FC236}">
-                <a16:creationId xmlns="" xmlns:a16="http://schemas.microsoft.com/office/drawing/2014/main" id="{7B78D71A-2EC3-4B1C-AE98-CEF4BA88B48C}"/>
+                <a16:creationId xmlns:a16="http://schemas.microsoft.com/office/drawing/2014/main" xmlns="" id="{7B78D71A-2EC3-4B1C-AE98-CEF4BA88B48C}"/>
               </a:ext>
             </a:extLst>
           </p:cNvPr>
@@ -2982,7 +2982,7 @@
           <p:cNvPr id="2" name="Title 1">
             <a:extLst>
               <a:ext uri="{FF2B5EF4-FFF2-40B4-BE49-F238E27FC236}">
-                <a16:creationId xmlns="" xmlns:a16="http://schemas.microsoft.com/office/drawing/2014/main" id="{42B4A99F-9EE0-4942-BCEE-A1E732C0F4E1}"/>
+                <a16:creationId xmlns:a16="http://schemas.microsoft.com/office/drawing/2014/main" xmlns="" id="{42B4A99F-9EE0-4942-BCEE-A1E732C0F4E1}"/>
               </a:ext>
             </a:extLst>
           </p:cNvPr>
@@ -3019,7 +3019,7 @@
           <p:cNvPr id="3" name="Picture Placeholder 2">
             <a:extLst>
               <a:ext uri="{FF2B5EF4-FFF2-40B4-BE49-F238E27FC236}">
-                <a16:creationId xmlns="" xmlns:a16="http://schemas.microsoft.com/office/drawing/2014/main" id="{4BA78B66-2785-4358-A99C-30D13EE9AD34}"/>
+                <a16:creationId xmlns:a16="http://schemas.microsoft.com/office/drawing/2014/main" xmlns="" id="{4BA78B66-2785-4358-A99C-30D13EE9AD34}"/>
               </a:ext>
             </a:extLst>
           </p:cNvPr>
@@ -3086,7 +3086,7 @@
           <p:cNvPr id="4" name="Text Placeholder 3">
             <a:extLst>
               <a:ext uri="{FF2B5EF4-FFF2-40B4-BE49-F238E27FC236}">
-                <a16:creationId xmlns="" xmlns:a16="http://schemas.microsoft.com/office/drawing/2014/main" id="{AA38E7B7-693B-436C-ACFB-D578D6C8538B}"/>
+                <a16:creationId xmlns:a16="http://schemas.microsoft.com/office/drawing/2014/main" xmlns="" id="{AA38E7B7-693B-436C-ACFB-D578D6C8538B}"/>
               </a:ext>
             </a:extLst>
           </p:cNvPr>
@@ -3157,7 +3157,7 @@
           <p:cNvPr id="5" name="Date Placeholder 4">
             <a:extLst>
               <a:ext uri="{FF2B5EF4-FFF2-40B4-BE49-F238E27FC236}">
-                <a16:creationId xmlns="" xmlns:a16="http://schemas.microsoft.com/office/drawing/2014/main" id="{1D59676D-A17F-46ED-B322-996E92CC669D}"/>
+                <a16:creationId xmlns:a16="http://schemas.microsoft.com/office/drawing/2014/main" xmlns="" id="{1D59676D-A17F-46ED-B322-996E92CC669D}"/>
               </a:ext>
             </a:extLst>
           </p:cNvPr>
@@ -3186,7 +3186,7 @@
           <p:cNvPr id="6" name="Footer Placeholder 5">
             <a:extLst>
               <a:ext uri="{FF2B5EF4-FFF2-40B4-BE49-F238E27FC236}">
-                <a16:creationId xmlns="" xmlns:a16="http://schemas.microsoft.com/office/drawing/2014/main" id="{6398B656-A461-4B3F-8ECD-A1C58EEC5D5D}"/>
+                <a16:creationId xmlns:a16="http://schemas.microsoft.com/office/drawing/2014/main" xmlns="" id="{6398B656-A461-4B3F-8ECD-A1C58EEC5D5D}"/>
               </a:ext>
             </a:extLst>
           </p:cNvPr>
@@ -3215,7 +3215,7 @@
           <p:cNvPr id="7" name="Slide Number Placeholder 6">
             <a:extLst>
               <a:ext uri="{FF2B5EF4-FFF2-40B4-BE49-F238E27FC236}">
-                <a16:creationId xmlns="" xmlns:a16="http://schemas.microsoft.com/office/drawing/2014/main" id="{F705B36D-F955-462B-899C-F46A6F9E5B53}"/>
+                <a16:creationId xmlns:a16="http://schemas.microsoft.com/office/drawing/2014/main" xmlns="" id="{F705B36D-F955-462B-899C-F46A6F9E5B53}"/>
               </a:ext>
             </a:extLst>
           </p:cNvPr>
@@ -3291,7 +3291,7 @@
           <p:cNvPr id="1026" name="Rectangle 2">
             <a:extLst>
               <a:ext uri="{FF2B5EF4-FFF2-40B4-BE49-F238E27FC236}">
-                <a16:creationId xmlns="" xmlns:a16="http://schemas.microsoft.com/office/drawing/2014/main" id="{01405D41-0CC5-41DF-A29F-0509945FC107}"/>
+                <a16:creationId xmlns:a16="http://schemas.microsoft.com/office/drawing/2014/main" xmlns="" id="{01405D41-0CC5-41DF-A29F-0509945FC107}"/>
               </a:ext>
             </a:extLst>
           </p:cNvPr>
@@ -3365,7 +3365,7 @@
           <p:cNvPr id="1027" name="Rectangle 3">
             <a:extLst>
               <a:ext uri="{FF2B5EF4-FFF2-40B4-BE49-F238E27FC236}">
-                <a16:creationId xmlns="" xmlns:a16="http://schemas.microsoft.com/office/drawing/2014/main" id="{8E07D3DA-2B85-42CC-8062-8B65F67586B0}"/>
+                <a16:creationId xmlns:a16="http://schemas.microsoft.com/office/drawing/2014/main" xmlns="" id="{8E07D3DA-2B85-42CC-8062-8B65F67586B0}"/>
               </a:ext>
             </a:extLst>
           </p:cNvPr>
@@ -3467,7 +3467,7 @@
           <p:cNvPr id="1028" name="Rectangle 4">
             <a:extLst>
               <a:ext uri="{FF2B5EF4-FFF2-40B4-BE49-F238E27FC236}">
-                <a16:creationId xmlns="" xmlns:a16="http://schemas.microsoft.com/office/drawing/2014/main" id="{E07E20C1-4C65-4624-AA2D-747E84F1D3CB}"/>
+                <a16:creationId xmlns:a16="http://schemas.microsoft.com/office/drawing/2014/main" xmlns="" id="{E07E20C1-4C65-4624-AA2D-747E84F1D3CB}"/>
               </a:ext>
             </a:extLst>
           </p:cNvPr>
@@ -3541,7 +3541,7 @@
           <p:cNvPr id="1029" name="Rectangle 5">
             <a:extLst>
               <a:ext uri="{FF2B5EF4-FFF2-40B4-BE49-F238E27FC236}">
-                <a16:creationId xmlns="" xmlns:a16="http://schemas.microsoft.com/office/drawing/2014/main" id="{DF6370B7-BED3-4B38-A932-BD0A5880CB44}"/>
+                <a16:creationId xmlns:a16="http://schemas.microsoft.com/office/drawing/2014/main" xmlns="" id="{DF6370B7-BED3-4B38-A932-BD0A5880CB44}"/>
               </a:ext>
             </a:extLst>
           </p:cNvPr>
@@ -3615,7 +3615,7 @@
           <p:cNvPr id="1030" name="Rectangle 6">
             <a:extLst>
               <a:ext uri="{FF2B5EF4-FFF2-40B4-BE49-F238E27FC236}">
-                <a16:creationId xmlns="" xmlns:a16="http://schemas.microsoft.com/office/drawing/2014/main" id="{848F6441-6898-4A31-A185-8673B9B54ACB}"/>
+                <a16:creationId xmlns:a16="http://schemas.microsoft.com/office/drawing/2014/main" xmlns="" id="{848F6441-6898-4A31-A185-8673B9B54ACB}"/>
               </a:ext>
             </a:extLst>
           </p:cNvPr>
@@ -4117,7 +4117,7 @@
           <p:cNvPr id="25602" name="Rectangle 2">
             <a:extLst>
               <a:ext uri="{FF2B5EF4-FFF2-40B4-BE49-F238E27FC236}">
-                <a16:creationId xmlns="" xmlns:a16="http://schemas.microsoft.com/office/drawing/2014/main" id="{D09A8D8C-80F7-440C-BEF1-9EFA4CBAAA33}"/>
+                <a16:creationId xmlns:a16="http://schemas.microsoft.com/office/drawing/2014/main" xmlns="" id="{D09A8D8C-80F7-440C-BEF1-9EFA4CBAAA33}"/>
               </a:ext>
             </a:extLst>
           </p:cNvPr>
@@ -4271,7 +4271,7 @@
           <p:cNvPr id="2" name="TextBox 1">
             <a:extLst>
               <a:ext uri="{FF2B5EF4-FFF2-40B4-BE49-F238E27FC236}">
-                <a16:creationId xmlns="" xmlns:a16="http://schemas.microsoft.com/office/drawing/2014/main" id="{E25158EC-8E35-4749-B0AA-B28E51586D46}"/>
+                <a16:creationId xmlns:a16="http://schemas.microsoft.com/office/drawing/2014/main" xmlns="" id="{E25158EC-8E35-4749-B0AA-B28E51586D46}"/>
               </a:ext>
             </a:extLst>
           </p:cNvPr>
@@ -4400,7 +4400,7 @@
           <p:cNvPr id="3" name="TextBox 2">
             <a:extLst>
               <a:ext uri="{FF2B5EF4-FFF2-40B4-BE49-F238E27FC236}">
-                <a16:creationId xmlns="" xmlns:a16="http://schemas.microsoft.com/office/drawing/2014/main" id="{42FDFB43-C59E-41F3-9FA4-597C3A074DCC}"/>
+                <a16:creationId xmlns:a16="http://schemas.microsoft.com/office/drawing/2014/main" xmlns="" id="{42FDFB43-C59E-41F3-9FA4-597C3A074DCC}"/>
               </a:ext>
             </a:extLst>
           </p:cNvPr>
@@ -4462,7 +4462,7 @@
           <p:cNvPr id="4" name="TextBox 3">
             <a:extLst>
               <a:ext uri="{FF2B5EF4-FFF2-40B4-BE49-F238E27FC236}">
-                <a16:creationId xmlns="" xmlns:a16="http://schemas.microsoft.com/office/drawing/2014/main" id="{D08DA78C-B7D1-47EA-94C6-947128292FE7}"/>
+                <a16:creationId xmlns:a16="http://schemas.microsoft.com/office/drawing/2014/main" xmlns="" id="{D08DA78C-B7D1-47EA-94C6-947128292FE7}"/>
               </a:ext>
             </a:extLst>
           </p:cNvPr>
@@ -4580,7 +4580,7 @@
           <p:cNvPr id="5" name="TextBox 4">
             <a:extLst>
               <a:ext uri="{FF2B5EF4-FFF2-40B4-BE49-F238E27FC236}">
-                <a16:creationId xmlns="" xmlns:a16="http://schemas.microsoft.com/office/drawing/2014/main" id="{693F6FE1-4D51-4BB1-9383-3D45BA230CC4}"/>
+                <a16:creationId xmlns:a16="http://schemas.microsoft.com/office/drawing/2014/main" xmlns="" id="{693F6FE1-4D51-4BB1-9383-3D45BA230CC4}"/>
               </a:ext>
             </a:extLst>
           </p:cNvPr>
@@ -4727,6 +4727,14 @@
   <p:clrMapOvr>
     <a:masterClrMapping/>
   </p:clrMapOvr>
+  <mc:AlternateContent xmlns:mc="http://schemas.openxmlformats.org/markup-compatibility/2006">
+    <mc:Choice xmlns:p14="http://schemas.microsoft.com/office/powerpoint/2010/main" Requires="p14">
+      <p:transition p14:dur="0"/>
+    </mc:Choice>
+    <mc:Fallback>
+      <p:transition/>
+    </mc:Fallback>
+  </mc:AlternateContent>
   <p:timing>
     <p:tnLst>
       <p:par>
@@ -4759,7 +4767,7 @@
           <p:cNvPr id="2" name="Title 1">
             <a:extLst>
               <a:ext uri="{FF2B5EF4-FFF2-40B4-BE49-F238E27FC236}">
-                <a16:creationId xmlns="" xmlns:a16="http://schemas.microsoft.com/office/drawing/2014/main" id="{9296360E-A856-4EFA-82BD-65F96B5D4536}"/>
+                <a16:creationId xmlns:a16="http://schemas.microsoft.com/office/drawing/2014/main" xmlns="" id="{9296360E-A856-4EFA-82BD-65F96B5D4536}"/>
               </a:ext>
             </a:extLst>
           </p:cNvPr>
@@ -4877,7 +4885,7 @@
           <p:cNvPr id="8" name="TextBox 7">
             <a:extLst>
               <a:ext uri="{FF2B5EF4-FFF2-40B4-BE49-F238E27FC236}">
-                <a16:creationId xmlns="" xmlns:a16="http://schemas.microsoft.com/office/drawing/2014/main" id="{D3A0E56C-EB23-403E-85B4-3366C94069E0}"/>
+                <a16:creationId xmlns:a16="http://schemas.microsoft.com/office/drawing/2014/main" xmlns="" id="{D3A0E56C-EB23-403E-85B4-3366C94069E0}"/>
               </a:ext>
             </a:extLst>
           </p:cNvPr>
@@ -5073,6 +5081,9 @@
   <p:clrMapOvr>
     <a:masterClrMapping/>
   </p:clrMapOvr>
+  <p:transition spd="slow">
+    <p:wipe/>
+  </p:transition>
   <p:timing>
     <p:tnLst>
       <p:par>
@@ -5105,7 +5116,7 @@
           <p:cNvPr id="2" name="Title 1">
             <a:extLst>
               <a:ext uri="{FF2B5EF4-FFF2-40B4-BE49-F238E27FC236}">
-                <a16:creationId xmlns="" xmlns:a16="http://schemas.microsoft.com/office/drawing/2014/main" id="{9296360E-A856-4EFA-82BD-65F96B5D4536}"/>
+                <a16:creationId xmlns:a16="http://schemas.microsoft.com/office/drawing/2014/main" xmlns="" id="{9296360E-A856-4EFA-82BD-65F96B5D4536}"/>
               </a:ext>
             </a:extLst>
           </p:cNvPr>
@@ -5240,7 +5251,7 @@
           <p:cNvPr id="11" name="TextBox 10">
             <a:extLst>
               <a:ext uri="{FF2B5EF4-FFF2-40B4-BE49-F238E27FC236}">
-                <a16:creationId xmlns="" xmlns:a16="http://schemas.microsoft.com/office/drawing/2014/main" id="{D3A0E56C-EB23-403E-85B4-3366C94069E0}"/>
+                <a16:creationId xmlns:a16="http://schemas.microsoft.com/office/drawing/2014/main" xmlns="" id="{D3A0E56C-EB23-403E-85B4-3366C94069E0}"/>
               </a:ext>
             </a:extLst>
           </p:cNvPr>
@@ -5436,6 +5447,18 @@
   <p:clrMapOvr>
     <a:masterClrMapping/>
   </p:clrMapOvr>
+  <mc:AlternateContent xmlns:mc="http://schemas.openxmlformats.org/markup-compatibility/2006">
+    <mc:Choice xmlns:p15="http://schemas.microsoft.com/office/powerpoint/2012/main" Requires="p15">
+      <p:transition xmlns:p14="http://schemas.microsoft.com/office/powerpoint/2010/main" spd="slow" p14:dur="1250">
+        <p15:prstTrans prst="pageCurlDouble"/>
+      </p:transition>
+    </mc:Choice>
+    <mc:Fallback>
+      <p:transition spd="slow">
+        <p:fade/>
+      </p:transition>
+    </mc:Fallback>
+  </mc:AlternateContent>
   <p:timing>
     <p:tnLst>
       <p:par>
@@ -5468,7 +5491,7 @@
           <p:cNvPr id="2" name="Title 1">
             <a:extLst>
               <a:ext uri="{FF2B5EF4-FFF2-40B4-BE49-F238E27FC236}">
-                <a16:creationId xmlns="" xmlns:a16="http://schemas.microsoft.com/office/drawing/2014/main" id="{9296360E-A856-4EFA-82BD-65F96B5D4536}"/>
+                <a16:creationId xmlns:a16="http://schemas.microsoft.com/office/drawing/2014/main" xmlns="" id="{9296360E-A856-4EFA-82BD-65F96B5D4536}"/>
               </a:ext>
             </a:extLst>
           </p:cNvPr>
@@ -5627,14 +5650,7 @@
                 <a:latin typeface="Times New Roman" panose="02020603050405020304" pitchFamily="18" charset="0"/>
                 <a:cs typeface="Times New Roman" panose="02020603050405020304" pitchFamily="18" charset="0"/>
               </a:rPr>
-              <a:t>Tối ưu các dòng </a:t>
-            </a:r>
-            <a:r>
-              <a:rPr lang="en-US" sz="2300" smtClean="0">
-                <a:latin typeface="Times New Roman" panose="02020603050405020304" pitchFamily="18" charset="0"/>
-                <a:cs typeface="Times New Roman" panose="02020603050405020304" pitchFamily="18" charset="0"/>
-              </a:rPr>
-              <a:t>code</a:t>
+              <a:t>Tối ưu các dòng code</a:t>
             </a:r>
           </a:p>
           <a:p>
@@ -5668,7 +5684,7 @@
           <p:cNvPr id="11" name="TextBox 10">
             <a:extLst>
               <a:ext uri="{FF2B5EF4-FFF2-40B4-BE49-F238E27FC236}">
-                <a16:creationId xmlns="" xmlns:a16="http://schemas.microsoft.com/office/drawing/2014/main" id="{D3A0E56C-EB23-403E-85B4-3366C94069E0}"/>
+                <a16:creationId xmlns:a16="http://schemas.microsoft.com/office/drawing/2014/main" xmlns="" id="{D3A0E56C-EB23-403E-85B4-3366C94069E0}"/>
               </a:ext>
             </a:extLst>
           </p:cNvPr>
@@ -5864,6 +5880,18 @@
   <p:clrMapOvr>
     <a:masterClrMapping/>
   </p:clrMapOvr>
+  <mc:AlternateContent xmlns:mc="http://schemas.openxmlformats.org/markup-compatibility/2006">
+    <mc:Choice xmlns:p14="http://schemas.microsoft.com/office/powerpoint/2010/main" Requires="p14">
+      <p:transition spd="slow" p14:dur="1300">
+        <p14:pan dir="u"/>
+      </p:transition>
+    </mc:Choice>
+    <mc:Fallback>
+      <p:transition spd="slow">
+        <p:fade/>
+      </p:transition>
+    </mc:Fallback>
+  </mc:AlternateContent>
   <p:timing>
     <p:tnLst>
       <p:par>
@@ -5917,11 +5945,7 @@
             </a:pPr>
             <a:r>
               <a:rPr lang="en-US" altLang="vi-VN" sz="6750"/>
-              <a:t>Cảm ơn thầy và các bạn đã </a:t>
-            </a:r>
-            <a:r>
-              <a:rPr lang="en-US" altLang="vi-VN" sz="6750"/>
-              <a:t>lắng </a:t>
+              <a:t>Cảm ơn thầy và các bạn đã lắng </a:t>
             </a:r>
             <a:r>
               <a:rPr lang="en-US" altLang="vi-VN" sz="6750" smtClean="0"/>
@@ -6111,9 +6135,18 @@
   <p:clrMapOvr>
     <a:masterClrMapping/>
   </p:clrMapOvr>
-  <p:transition spd="med">
-    <p:fade/>
-  </p:transition>
+  <mc:AlternateContent xmlns:mc="http://schemas.openxmlformats.org/markup-compatibility/2006">
+    <mc:Choice xmlns:p14="http://schemas.microsoft.com/office/powerpoint/2010/main" Requires="p14">
+      <p:transition spd="slow" p14:dur="800">
+        <p:circle/>
+      </p:transition>
+    </mc:Choice>
+    <mc:Fallback>
+      <p:transition spd="slow">
+        <p:circle/>
+      </p:transition>
+    </mc:Fallback>
+  </mc:AlternateContent>
   <p:timing>
     <p:tnLst>
       <p:par>
@@ -6146,7 +6179,7 @@
           <p:cNvPr id="2" name="Title 1">
             <a:extLst>
               <a:ext uri="{FF2B5EF4-FFF2-40B4-BE49-F238E27FC236}">
-                <a16:creationId xmlns="" xmlns:a16="http://schemas.microsoft.com/office/drawing/2014/main" id="{562086D8-3D28-46A7-89AF-112D4006E93B}"/>
+                <a16:creationId xmlns:a16="http://schemas.microsoft.com/office/drawing/2014/main" xmlns="" id="{562086D8-3D28-46A7-89AF-112D4006E93B}"/>
               </a:ext>
             </a:extLst>
           </p:cNvPr>
@@ -6193,7 +6226,7 @@
           <p:cNvPr id="6" name="TextBox 5">
             <a:extLst>
               <a:ext uri="{FF2B5EF4-FFF2-40B4-BE49-F238E27FC236}">
-                <a16:creationId xmlns="" xmlns:a16="http://schemas.microsoft.com/office/drawing/2014/main" id="{2B74EAB1-1EED-4B85-BB8F-BCA70C9B395A}"/>
+                <a16:creationId xmlns:a16="http://schemas.microsoft.com/office/drawing/2014/main" xmlns="" id="{2B74EAB1-1EED-4B85-BB8F-BCA70C9B395A}"/>
               </a:ext>
             </a:extLst>
           </p:cNvPr>
@@ -6521,6 +6554,9 @@
   <p:clrMapOvr>
     <a:masterClrMapping/>
   </p:clrMapOvr>
+  <p:transition spd="slow">
+    <p:push dir="u"/>
+  </p:transition>
   <p:timing>
     <p:tnLst>
       <p:par>
@@ -6553,7 +6589,7 @@
           <p:cNvPr id="2" name="Title 1">
             <a:extLst>
               <a:ext uri="{FF2B5EF4-FFF2-40B4-BE49-F238E27FC236}">
-                <a16:creationId xmlns="" xmlns:a16="http://schemas.microsoft.com/office/drawing/2014/main" id="{61CA51B0-82D0-47B3-9A2A-3E19C05596DF}"/>
+                <a16:creationId xmlns:a16="http://schemas.microsoft.com/office/drawing/2014/main" xmlns="" id="{61CA51B0-82D0-47B3-9A2A-3E19C05596DF}"/>
               </a:ext>
             </a:extLst>
           </p:cNvPr>
@@ -6593,7 +6629,7 @@
           <p:cNvPr id="3" name="Content Placeholder 2">
             <a:extLst>
               <a:ext uri="{FF2B5EF4-FFF2-40B4-BE49-F238E27FC236}">
-                <a16:creationId xmlns="" xmlns:a16="http://schemas.microsoft.com/office/drawing/2014/main" id="{F9E2F5A9-748C-4745-9F03-F0AD640E91BF}"/>
+                <a16:creationId xmlns:a16="http://schemas.microsoft.com/office/drawing/2014/main" xmlns="" id="{F9E2F5A9-748C-4745-9F03-F0AD640E91BF}"/>
               </a:ext>
             </a:extLst>
           </p:cNvPr>
@@ -6714,7 +6750,7 @@
           <p:cNvPr id="5" name="TextBox 4">
             <a:extLst>
               <a:ext uri="{FF2B5EF4-FFF2-40B4-BE49-F238E27FC236}">
-                <a16:creationId xmlns="" xmlns:a16="http://schemas.microsoft.com/office/drawing/2014/main" id="{D3A0E56C-EB23-403E-85B4-3366C94069E0}"/>
+                <a16:creationId xmlns:a16="http://schemas.microsoft.com/office/drawing/2014/main" xmlns="" id="{D3A0E56C-EB23-403E-85B4-3366C94069E0}"/>
               </a:ext>
             </a:extLst>
           </p:cNvPr>
@@ -6905,7 +6941,7 @@
           <p:cNvPr id="1026" name="Picture 2" descr="Archery Target Board at Rs 2000/set | Gandhi Nagar | Meerut| ID: 10940655730">
             <a:extLst>
               <a:ext uri="{FF2B5EF4-FFF2-40B4-BE49-F238E27FC236}">
-                <a16:creationId xmlns="" xmlns:a16="http://schemas.microsoft.com/office/drawing/2014/main" id="{7F911F79-9E4C-4940-86C2-02AA53779DB7}"/>
+                <a16:creationId xmlns:a16="http://schemas.microsoft.com/office/drawing/2014/main" xmlns="" id="{7F911F79-9E4C-4940-86C2-02AA53779DB7}"/>
               </a:ext>
             </a:extLst>
           </p:cNvPr>
@@ -6952,7 +6988,7 @@
           <p:cNvPr id="6" name="TextBox 5">
             <a:extLst>
               <a:ext uri="{FF2B5EF4-FFF2-40B4-BE49-F238E27FC236}">
-                <a16:creationId xmlns="" xmlns:a16="http://schemas.microsoft.com/office/drawing/2014/main" id="{04C371FB-0C67-49A0-8BD0-5D5F2775AD6B}"/>
+                <a16:creationId xmlns:a16="http://schemas.microsoft.com/office/drawing/2014/main" xmlns="" id="{04C371FB-0C67-49A0-8BD0-5D5F2775AD6B}"/>
               </a:ext>
             </a:extLst>
           </p:cNvPr>
@@ -7495,6 +7531,9 @@
   <p:clrMapOvr>
     <a:masterClrMapping/>
   </p:clrMapOvr>
+  <p:transition spd="slow">
+    <p:cover/>
+  </p:transition>
   <p:timing>
     <p:tnLst>
       <p:par>
@@ -7527,7 +7566,7 @@
           <p:cNvPr id="2" name="Title 1">
             <a:extLst>
               <a:ext uri="{FF2B5EF4-FFF2-40B4-BE49-F238E27FC236}">
-                <a16:creationId xmlns="" xmlns:a16="http://schemas.microsoft.com/office/drawing/2014/main" id="{CC6494E0-A147-496C-BFB7-C082B40B95D9}"/>
+                <a16:creationId xmlns:a16="http://schemas.microsoft.com/office/drawing/2014/main" xmlns="" id="{CC6494E0-A147-496C-BFB7-C082B40B95D9}"/>
               </a:ext>
             </a:extLst>
           </p:cNvPr>
@@ -7541,7 +7580,7 @@
         <p:spPr>
           <a:xfrm>
             <a:off x="1752600" y="1"/>
-            <a:ext cx="4191000" cy="1227138"/>
+            <a:ext cx="4953000" cy="1227138"/>
           </a:xfrm>
         </p:spPr>
         <p:txBody>
@@ -7564,7 +7603,7 @@
           <p:cNvPr id="3" name="Content Placeholder 2">
             <a:extLst>
               <a:ext uri="{FF2B5EF4-FFF2-40B4-BE49-F238E27FC236}">
-                <a16:creationId xmlns="" xmlns:a16="http://schemas.microsoft.com/office/drawing/2014/main" id="{38D42FE5-A1B3-475E-858B-ED29BC50C835}"/>
+                <a16:creationId xmlns:a16="http://schemas.microsoft.com/office/drawing/2014/main" xmlns="" id="{38D42FE5-A1B3-475E-858B-ED29BC50C835}"/>
               </a:ext>
             </a:extLst>
           </p:cNvPr>
@@ -7578,7 +7617,7 @@
         <p:spPr>
           <a:xfrm>
             <a:off x="0" y="1828800"/>
-            <a:ext cx="8839200" cy="4538662"/>
+            <a:ext cx="5105400" cy="4538662"/>
           </a:xfrm>
         </p:spPr>
         <p:txBody>
@@ -7586,20 +7625,27 @@
           <a:lstStyle/>
           <a:p>
             <a:r>
-              <a:rPr lang="en-US" sz="2300" smtClean="0">
-                <a:latin typeface="Times New Roman" panose="02020603050405020304" pitchFamily="18" charset="0"/>
-                <a:cs typeface="Times New Roman" panose="02020603050405020304" pitchFamily="18" charset="0"/>
-              </a:rPr>
-              <a:t>Tập dữ liệu Divorce có 54 cột thuộc tính, 1 cột nhãn và 170 dòng dữ liệu</a:t>
-            </a:r>
-            <a:endParaRPr lang="en-US" sz="2300" dirty="0">
+              <a:rPr lang="en-US" sz="2000" smtClean="0">
+                <a:latin typeface="Times New Roman" panose="02020603050405020304" pitchFamily="18" charset="0"/>
+                <a:cs typeface="Times New Roman" panose="02020603050405020304" pitchFamily="18" charset="0"/>
+              </a:rPr>
+              <a:t>Tập dữ liệu Divorce có 54 cột thuộc tính, 1 cột nhãn và 170 dòng dữ </a:t>
+            </a:r>
+            <a:r>
+              <a:rPr lang="en-US" sz="2000" smtClean="0">
+                <a:latin typeface="Times New Roman" panose="02020603050405020304" pitchFamily="18" charset="0"/>
+                <a:cs typeface="Times New Roman" panose="02020603050405020304" pitchFamily="18" charset="0"/>
+              </a:rPr>
+              <a:t>liệu</a:t>
+            </a:r>
+            <a:endParaRPr lang="en-US" sz="2000" dirty="0">
               <a:latin typeface="Times New Roman" panose="02020603050405020304" pitchFamily="18" charset="0"/>
               <a:cs typeface="Times New Roman" panose="02020603050405020304" pitchFamily="18" charset="0"/>
             </a:endParaRPr>
           </a:p>
           <a:p>
             <a:r>
-              <a:rPr lang="en-US" sz="2300" smtClean="0">
+              <a:rPr lang="en-US" sz="2000" smtClean="0">
                 <a:latin typeface="Times New Roman" panose="02020603050405020304" pitchFamily="18" charset="0"/>
                 <a:cs typeface="Times New Roman" panose="02020603050405020304" pitchFamily="18" charset="0"/>
               </a:rPr>
@@ -7609,53 +7655,39 @@
           <a:p>
             <a:pPr lvl="1"/>
             <a:r>
-              <a:rPr lang="en-US" sz="2300" smtClean="0">
-                <a:latin typeface="Times New Roman" panose="02020603050405020304" pitchFamily="18" charset="0"/>
-                <a:cs typeface="Times New Roman" panose="02020603050405020304" pitchFamily="18" charset="0"/>
-              </a:rPr>
-              <a:t>Các thuộc tính biễu diễn cho các câu hỏi</a:t>
+              <a:rPr lang="en-US" sz="2000" smtClean="0">
+                <a:latin typeface="Times New Roman" panose="02020603050405020304" pitchFamily="18" charset="0"/>
+                <a:cs typeface="Times New Roman" panose="02020603050405020304" pitchFamily="18" charset="0"/>
+              </a:rPr>
+              <a:t>Thuộc tính biễu diễn cho các câu hỏi</a:t>
             </a:r>
           </a:p>
           <a:p>
             <a:pPr lvl="1"/>
             <a:r>
-              <a:rPr lang="en-US" sz="2300" smtClean="0">
-                <a:latin typeface="Times New Roman" panose="02020603050405020304" pitchFamily="18" charset="0"/>
-                <a:cs typeface="Times New Roman" panose="02020603050405020304" pitchFamily="18" charset="0"/>
-              </a:rPr>
-              <a:t>Cột nhãn có hai giá trị 1 (ly hôn) và 0 (không ly hôn)</a:t>
+              <a:rPr lang="en-US" sz="2000" smtClean="0">
+                <a:latin typeface="Times New Roman" panose="02020603050405020304" pitchFamily="18" charset="0"/>
+                <a:cs typeface="Times New Roman" panose="02020603050405020304" pitchFamily="18" charset="0"/>
+              </a:rPr>
+              <a:t>Nhãn có hai giá trị 1 (ly hôn) và 0 (không ly hôn)</a:t>
             </a:r>
           </a:p>
           <a:p>
             <a:pPr lvl="1"/>
             <a:r>
-              <a:rPr lang="en-US" sz="2300" smtClean="0">
-                <a:latin typeface="Times New Roman" panose="02020603050405020304" pitchFamily="18" charset="0"/>
-                <a:cs typeface="Times New Roman" panose="02020603050405020304" pitchFamily="18" charset="0"/>
-              </a:rPr>
-              <a:t>Mỗi dòng dữ liệu biễu diễn cho một trường hợp ly hôn hoặc không ly hôn</a:t>
-            </a:r>
-          </a:p>
-          <a:p>
-            <a:pPr lvl="1"/>
-            <a:r>
-              <a:rPr lang="en-US" sz="2300" smtClean="0">
+              <a:rPr lang="en-US" sz="2000" smtClean="0">
                 <a:latin typeface="Times New Roman" panose="02020603050405020304" pitchFamily="18" charset="0"/>
                 <a:cs typeface="Times New Roman" panose="02020603050405020304" pitchFamily="18" charset="0"/>
               </a:rPr>
               <a:t>Có năm giá trị trong các cột thuộc tính (0 : không đồng tình nhất – 4 : đồng tình nhất )</a:t>
             </a:r>
-            <a:endParaRPr lang="en-US" sz="2300">
-              <a:latin typeface="Times New Roman" panose="02020603050405020304" pitchFamily="18" charset="0"/>
-              <a:cs typeface="Times New Roman" panose="02020603050405020304" pitchFamily="18" charset="0"/>
-            </a:endParaRPr>
           </a:p>
           <a:p>
             <a:pPr marL="457200" lvl="1" indent="0">
               <a:buNone/>
             </a:pPr>
             <a:r>
-              <a:rPr lang="en-US" sz="2300" smtClean="0">
+              <a:rPr lang="en-US" sz="2000" smtClean="0">
                 <a:latin typeface="Times New Roman" panose="02020603050405020304" pitchFamily="18" charset="0"/>
                 <a:cs typeface="Times New Roman" panose="02020603050405020304" pitchFamily="18" charset="0"/>
               </a:rPr>
@@ -7667,20 +7699,13 @@
               <a:buNone/>
             </a:pPr>
             <a:r>
-              <a:rPr lang="en-US" sz="2300">
-                <a:latin typeface="Times New Roman" panose="02020603050405020304" pitchFamily="18" charset="0"/>
-                <a:cs typeface="Times New Roman" panose="02020603050405020304" pitchFamily="18" charset="0"/>
-              </a:rPr>
-              <a:t>	</a:t>
-            </a:r>
-            <a:r>
-              <a:rPr lang="en-US" sz="2300" smtClean="0">
-                <a:latin typeface="Times New Roman" panose="02020603050405020304" pitchFamily="18" charset="0"/>
-                <a:cs typeface="Times New Roman" panose="02020603050405020304" pitchFamily="18" charset="0"/>
-              </a:rPr>
-              <a:t>	         nhãn 1 : 84 trường hợp</a:t>
-            </a:r>
-            <a:endParaRPr lang="en-US" sz="2300">
+              <a:rPr lang="en-US" sz="2000" smtClean="0">
+                <a:latin typeface="Times New Roman" panose="02020603050405020304" pitchFamily="18" charset="0"/>
+                <a:cs typeface="Times New Roman" panose="02020603050405020304" pitchFamily="18" charset="0"/>
+              </a:rPr>
+              <a:t>		      nhãn 1 : 84 trường hợp</a:t>
+            </a:r>
+            <a:endParaRPr lang="en-US" sz="2000">
               <a:latin typeface="Times New Roman" panose="02020603050405020304" pitchFamily="18" charset="0"/>
               <a:cs typeface="Times New Roman" panose="02020603050405020304" pitchFamily="18" charset="0"/>
             </a:endParaRPr>
@@ -7716,7 +7741,7 @@
           <p:cNvPr id="8" name="TextBox 7">
             <a:extLst>
               <a:ext uri="{FF2B5EF4-FFF2-40B4-BE49-F238E27FC236}">
-                <a16:creationId xmlns="" xmlns:a16="http://schemas.microsoft.com/office/drawing/2014/main" id="{D3A0E56C-EB23-403E-85B4-3366C94069E0}"/>
+                <a16:creationId xmlns:a16="http://schemas.microsoft.com/office/drawing/2014/main" xmlns="" id="{D3A0E56C-EB23-403E-85B4-3366C94069E0}"/>
               </a:ext>
             </a:extLst>
           </p:cNvPr>
@@ -7902,6 +7927,36 @@
           </a:p>
         </p:txBody>
       </p:sp>
+      <p:pic>
+        <p:nvPicPr>
+          <p:cNvPr id="9" name="Picture 8"/>
+          <p:cNvPicPr>
+            <a:picLocks noChangeAspect="1"/>
+          </p:cNvPicPr>
+          <p:nvPr/>
+        </p:nvPicPr>
+        <p:blipFill>
+          <a:blip r:embed="rId2">
+            <a:extLst>
+              <a:ext uri="{28A0092B-C50C-407E-A947-70E740481C1C}">
+                <a14:useLocalDpi xmlns:a14="http://schemas.microsoft.com/office/drawing/2010/main" val="0"/>
+              </a:ext>
+            </a:extLst>
+          </a:blip>
+          <a:stretch>
+            <a:fillRect/>
+          </a:stretch>
+        </p:blipFill>
+        <p:spPr>
+          <a:xfrm>
+            <a:off x="5105401" y="1833562"/>
+            <a:ext cx="4000500" cy="2814638"/>
+          </a:xfrm>
+          <a:prstGeom prst="rect">
+            <a:avLst/>
+          </a:prstGeom>
+        </p:spPr>
+      </p:pic>
     </p:spTree>
     <p:extLst>
       <p:ext uri="{BB962C8B-B14F-4D97-AF65-F5344CB8AC3E}">
@@ -7912,6 +7967,9 @@
   <p:clrMapOvr>
     <a:masterClrMapping/>
   </p:clrMapOvr>
+  <p:transition spd="slow">
+    <p:wipe/>
+  </p:transition>
   <p:timing>
     <p:tnLst>
       <p:par>
@@ -7944,7 +8002,7 @@
           <p:cNvPr id="2" name="Title 1">
             <a:extLst>
               <a:ext uri="{FF2B5EF4-FFF2-40B4-BE49-F238E27FC236}">
-                <a16:creationId xmlns="" xmlns:a16="http://schemas.microsoft.com/office/drawing/2014/main" id="{9296360E-A856-4EFA-82BD-65F96B5D4536}"/>
+                <a16:creationId xmlns:a16="http://schemas.microsoft.com/office/drawing/2014/main" xmlns="" id="{9296360E-A856-4EFA-82BD-65F96B5D4536}"/>
               </a:ext>
             </a:extLst>
           </p:cNvPr>
@@ -7991,7 +8049,7 @@
           <p:cNvPr id="3" name="Content Placeholder 2">
             <a:extLst>
               <a:ext uri="{FF2B5EF4-FFF2-40B4-BE49-F238E27FC236}">
-                <a16:creationId xmlns="" xmlns:a16="http://schemas.microsoft.com/office/drawing/2014/main" id="{7AABFE05-367D-48E1-9ACA-8CEA039F3FAB}"/>
+                <a16:creationId xmlns:a16="http://schemas.microsoft.com/office/drawing/2014/main" xmlns="" id="{7AABFE05-367D-48E1-9ACA-8CEA039F3FAB}"/>
               </a:ext>
             </a:extLst>
           </p:cNvPr>
@@ -8321,7 +8379,7 @@
           <p:cNvPr id="15" name="TextBox 14">
             <a:extLst>
               <a:ext uri="{FF2B5EF4-FFF2-40B4-BE49-F238E27FC236}">
-                <a16:creationId xmlns="" xmlns:a16="http://schemas.microsoft.com/office/drawing/2014/main" id="{D3A0E56C-EB23-403E-85B4-3366C94069E0}"/>
+                <a16:creationId xmlns:a16="http://schemas.microsoft.com/office/drawing/2014/main" xmlns="" id="{D3A0E56C-EB23-403E-85B4-3366C94069E0}"/>
               </a:ext>
             </a:extLst>
           </p:cNvPr>
@@ -8517,6 +8575,9 @@
   <p:clrMapOvr>
     <a:masterClrMapping/>
   </p:clrMapOvr>
+  <p:transition spd="slow">
+    <p:wipe/>
+  </p:transition>
   <p:timing>
     <p:tnLst>
       <p:par>
@@ -8549,7 +8610,7 @@
           <p:cNvPr id="2" name="Title 1">
             <a:extLst>
               <a:ext uri="{FF2B5EF4-FFF2-40B4-BE49-F238E27FC236}">
-                <a16:creationId xmlns="" xmlns:a16="http://schemas.microsoft.com/office/drawing/2014/main" id="{9296360E-A856-4EFA-82BD-65F96B5D4536}"/>
+                <a16:creationId xmlns:a16="http://schemas.microsoft.com/office/drawing/2014/main" xmlns="" id="{9296360E-A856-4EFA-82BD-65F96B5D4536}"/>
               </a:ext>
             </a:extLst>
           </p:cNvPr>
@@ -8658,8 +8719,54 @@
                 <a:latin typeface="Times New Roman" panose="02020603050405020304" pitchFamily="18" charset="0"/>
                 <a:cs typeface="Times New Roman" panose="02020603050405020304" pitchFamily="18" charset="0"/>
               </a:rPr>
-              <a:t>Sử dụng các giải thuật : RandomForest, DecisionTree và GaussianNB</a:t>
-            </a:r>
+              <a:t>Sử dụng các giải thuật : </a:t>
+            </a:r>
+            <a:r>
+              <a:rPr lang="en-US" sz="2300" smtClean="0">
+                <a:latin typeface="Times New Roman" panose="02020603050405020304" pitchFamily="18" charset="0"/>
+                <a:cs typeface="Times New Roman" panose="02020603050405020304" pitchFamily="18" charset="0"/>
+              </a:rPr>
+              <a:t>Rừng ngẫu nhiên</a:t>
+            </a:r>
+            <a:r>
+              <a:rPr lang="vi-VN" sz="2300" smtClean="0">
+                <a:latin typeface="Times New Roman" panose="02020603050405020304" pitchFamily="18" charset="0"/>
+                <a:cs typeface="Times New Roman" panose="02020603050405020304" pitchFamily="18" charset="0"/>
+              </a:rPr>
+              <a:t>, </a:t>
+            </a:r>
+            <a:r>
+              <a:rPr lang="en-US" sz="2300" smtClean="0">
+                <a:latin typeface="Times New Roman" panose="02020603050405020304" pitchFamily="18" charset="0"/>
+                <a:cs typeface="Times New Roman" panose="02020603050405020304" pitchFamily="18" charset="0"/>
+              </a:rPr>
+              <a:t>Cây quyết định</a:t>
+            </a:r>
+            <a:r>
+              <a:rPr lang="vi-VN" sz="2300" smtClean="0">
+                <a:latin typeface="Times New Roman" panose="02020603050405020304" pitchFamily="18" charset="0"/>
+                <a:cs typeface="Times New Roman" panose="02020603050405020304" pitchFamily="18" charset="0"/>
+              </a:rPr>
+              <a:t> </a:t>
+            </a:r>
+            <a:r>
+              <a:rPr lang="vi-VN" sz="2300">
+                <a:latin typeface="Times New Roman" panose="02020603050405020304" pitchFamily="18" charset="0"/>
+                <a:cs typeface="Times New Roman" panose="02020603050405020304" pitchFamily="18" charset="0"/>
+              </a:rPr>
+              <a:t>và </a:t>
+            </a:r>
+            <a:r>
+              <a:rPr lang="en-US" sz="2300" smtClean="0">
+                <a:latin typeface="Times New Roman" panose="02020603050405020304" pitchFamily="18" charset="0"/>
+                <a:cs typeface="Times New Roman" panose="02020603050405020304" pitchFamily="18" charset="0"/>
+              </a:rPr>
+              <a:t>Bayes thơ ngây</a:t>
+            </a:r>
+            <a:endParaRPr lang="vi-VN" sz="2300">
+              <a:latin typeface="Times New Roman" panose="02020603050405020304" pitchFamily="18" charset="0"/>
+              <a:cs typeface="Times New Roman" panose="02020603050405020304" pitchFamily="18" charset="0"/>
+            </a:endParaRPr>
           </a:p>
           <a:p>
             <a:endParaRPr lang="vi-VN" sz="2300" smtClean="0">
@@ -8810,7 +8917,7 @@
           <p:cNvPr id="10" name="TextBox 9">
             <a:extLst>
               <a:ext uri="{FF2B5EF4-FFF2-40B4-BE49-F238E27FC236}">
-                <a16:creationId xmlns="" xmlns:a16="http://schemas.microsoft.com/office/drawing/2014/main" id="{D3A0E56C-EB23-403E-85B4-3366C94069E0}"/>
+                <a16:creationId xmlns:a16="http://schemas.microsoft.com/office/drawing/2014/main" xmlns="" id="{D3A0E56C-EB23-403E-85B4-3366C94069E0}"/>
               </a:ext>
             </a:extLst>
           </p:cNvPr>
@@ -9006,6 +9113,9 @@
   <p:clrMapOvr>
     <a:masterClrMapping/>
   </p:clrMapOvr>
+  <p:transition spd="slow">
+    <p:wipe/>
+  </p:transition>
   <p:timing>
     <p:tnLst>
       <p:par>
@@ -9038,7 +9148,7 @@
           <p:cNvPr id="2" name="Title 1">
             <a:extLst>
               <a:ext uri="{FF2B5EF4-FFF2-40B4-BE49-F238E27FC236}">
-                <a16:creationId xmlns="" xmlns:a16="http://schemas.microsoft.com/office/drawing/2014/main" id="{9296360E-A856-4EFA-82BD-65F96B5D4536}"/>
+                <a16:creationId xmlns:a16="http://schemas.microsoft.com/office/drawing/2014/main" xmlns="" id="{9296360E-A856-4EFA-82BD-65F96B5D4536}"/>
               </a:ext>
             </a:extLst>
           </p:cNvPr>
@@ -9141,11 +9251,25 @@
               <a:buChar char="o"/>
             </a:pPr>
             <a:r>
+              <a:rPr lang="en-US" sz="2300" smtClean="0">
+                <a:latin typeface="Times New Roman" panose="02020603050405020304" pitchFamily="18" charset="0"/>
+                <a:cs typeface="Times New Roman" panose="02020603050405020304" pitchFamily="18" charset="0"/>
+              </a:rPr>
+              <a:t>Rừng ngẫu nhiên</a:t>
+            </a:r>
+            <a:r>
+              <a:rPr lang="vi-VN" sz="2300" smtClean="0">
+                <a:latin typeface="Times New Roman" panose="02020603050405020304" pitchFamily="18" charset="0"/>
+                <a:cs typeface="Times New Roman" panose="02020603050405020304" pitchFamily="18" charset="0"/>
+              </a:rPr>
+              <a:t> </a:t>
+            </a:r>
+            <a:r>
               <a:rPr lang="vi-VN" sz="2300">
                 <a:latin typeface="Times New Roman" panose="02020603050405020304" pitchFamily="18" charset="0"/>
                 <a:cs typeface="Times New Roman" panose="02020603050405020304" pitchFamily="18" charset="0"/>
               </a:rPr>
-              <a:t>RandomForest : </a:t>
+              <a:t>: </a:t>
             </a:r>
             <a:r>
               <a:rPr lang="vi-VN" sz="2300" smtClean="0">
@@ -9165,11 +9289,25 @@
               <a:buChar char="o"/>
             </a:pPr>
             <a:r>
+              <a:rPr lang="en-US" sz="2300" smtClean="0">
+                <a:latin typeface="Times New Roman" panose="02020603050405020304" pitchFamily="18" charset="0"/>
+                <a:cs typeface="Times New Roman" panose="02020603050405020304" pitchFamily="18" charset="0"/>
+              </a:rPr>
+              <a:t>Cây quyết định</a:t>
+            </a:r>
+            <a:r>
               <a:rPr lang="vi-VN" sz="2300" smtClean="0">
                 <a:latin typeface="Times New Roman" panose="02020603050405020304" pitchFamily="18" charset="0"/>
                 <a:cs typeface="Times New Roman" panose="02020603050405020304" pitchFamily="18" charset="0"/>
               </a:rPr>
-              <a:t>DecisionTree : 99,41%</a:t>
+              <a:t> </a:t>
+            </a:r>
+            <a:r>
+              <a:rPr lang="vi-VN" sz="2300" smtClean="0">
+                <a:latin typeface="Times New Roman" panose="02020603050405020304" pitchFamily="18" charset="0"/>
+                <a:cs typeface="Times New Roman" panose="02020603050405020304" pitchFamily="18" charset="0"/>
+              </a:rPr>
+              <a:t>: 99,41%</a:t>
             </a:r>
             <a:endParaRPr lang="vi-VN" sz="2300">
               <a:latin typeface="Times New Roman" panose="02020603050405020304" pitchFamily="18" charset="0"/>
@@ -9182,11 +9320,25 @@
               <a:buChar char="o"/>
             </a:pPr>
             <a:r>
+              <a:rPr lang="en-US" sz="2300" smtClean="0">
+                <a:latin typeface="Times New Roman" panose="02020603050405020304" pitchFamily="18" charset="0"/>
+                <a:cs typeface="Times New Roman" panose="02020603050405020304" pitchFamily="18" charset="0"/>
+              </a:rPr>
+              <a:t>Bayes thơ ngây</a:t>
+            </a:r>
+            <a:r>
               <a:rPr lang="vi-VN" sz="2300" smtClean="0">
                 <a:latin typeface="Times New Roman" panose="02020603050405020304" pitchFamily="18" charset="0"/>
                 <a:cs typeface="Times New Roman" panose="02020603050405020304" pitchFamily="18" charset="0"/>
               </a:rPr>
-              <a:t>GaussianNB : 97.05%</a:t>
+              <a:t> </a:t>
+            </a:r>
+            <a:r>
+              <a:rPr lang="vi-VN" sz="2300" smtClean="0">
+                <a:latin typeface="Times New Roman" panose="02020603050405020304" pitchFamily="18" charset="0"/>
+                <a:cs typeface="Times New Roman" panose="02020603050405020304" pitchFamily="18" charset="0"/>
+              </a:rPr>
+              <a:t>: 97.05%</a:t>
             </a:r>
             <a:endParaRPr lang="vi-VN" sz="2300">
               <a:latin typeface="Times New Roman" panose="02020603050405020304" pitchFamily="18" charset="0"/>
@@ -9211,7 +9363,28 @@
                 <a:latin typeface="Times New Roman" panose="02020603050405020304" pitchFamily="18" charset="0"/>
                 <a:cs typeface="Times New Roman" panose="02020603050405020304" pitchFamily="18" charset="0"/>
               </a:rPr>
-              <a:t>=&gt; Chọn DecisionTree để xây dựng mô hình</a:t>
+              <a:t>=&gt; Chọn </a:t>
+            </a:r>
+            <a:r>
+              <a:rPr lang="en-US" sz="2300" smtClean="0">
+                <a:latin typeface="Times New Roman" panose="02020603050405020304" pitchFamily="18" charset="0"/>
+                <a:cs typeface="Times New Roman" panose="02020603050405020304" pitchFamily="18" charset="0"/>
+              </a:rPr>
+              <a:t>Cây quyết định</a:t>
+            </a:r>
+            <a:r>
+              <a:rPr lang="vi-VN" sz="2300" smtClean="0">
+                <a:latin typeface="Times New Roman" panose="02020603050405020304" pitchFamily="18" charset="0"/>
+                <a:cs typeface="Times New Roman" panose="02020603050405020304" pitchFamily="18" charset="0"/>
+              </a:rPr>
+              <a:t> </a:t>
+            </a:r>
+            <a:r>
+              <a:rPr lang="vi-VN" sz="2300" smtClean="0">
+                <a:latin typeface="Times New Roman" panose="02020603050405020304" pitchFamily="18" charset="0"/>
+                <a:cs typeface="Times New Roman" panose="02020603050405020304" pitchFamily="18" charset="0"/>
+              </a:rPr>
+              <a:t>để xây dựng mô hình</a:t>
             </a:r>
           </a:p>
         </p:txBody>
@@ -9269,7 +9442,7 @@
           <p:cNvPr id="7" name="TextBox 6">
             <a:extLst>
               <a:ext uri="{FF2B5EF4-FFF2-40B4-BE49-F238E27FC236}">
-                <a16:creationId xmlns="" xmlns:a16="http://schemas.microsoft.com/office/drawing/2014/main" id="{D3A0E56C-EB23-403E-85B4-3366C94069E0}"/>
+                <a16:creationId xmlns:a16="http://schemas.microsoft.com/office/drawing/2014/main" xmlns="" id="{D3A0E56C-EB23-403E-85B4-3366C94069E0}"/>
               </a:ext>
             </a:extLst>
           </p:cNvPr>
@@ -9465,6 +9638,9 @@
   <p:clrMapOvr>
     <a:masterClrMapping/>
   </p:clrMapOvr>
+  <p:transition spd="slow">
+    <p:wipe/>
+  </p:transition>
   <p:timing>
     <p:tnLst>
       <p:par>
@@ -9497,7 +9673,7 @@
           <p:cNvPr id="2" name="Title 1">
             <a:extLst>
               <a:ext uri="{FF2B5EF4-FFF2-40B4-BE49-F238E27FC236}">
-                <a16:creationId xmlns="" xmlns:a16="http://schemas.microsoft.com/office/drawing/2014/main" id="{9296360E-A856-4EFA-82BD-65F96B5D4536}"/>
+                <a16:creationId xmlns:a16="http://schemas.microsoft.com/office/drawing/2014/main" xmlns="" id="{9296360E-A856-4EFA-82BD-65F96B5D4536}"/>
               </a:ext>
             </a:extLst>
           </p:cNvPr>
@@ -9582,14 +9758,7 @@
                 <a:latin typeface="Times New Roman" panose="02020603050405020304" pitchFamily="18" charset="0"/>
                 <a:cs typeface="Times New Roman" panose="02020603050405020304" pitchFamily="18" charset="0"/>
               </a:rPr>
-              <a:t>Sử </a:t>
-            </a:r>
-            <a:r>
-              <a:rPr lang="en-US" sz="2300" smtClean="0">
-                <a:latin typeface="Times New Roman" panose="02020603050405020304" pitchFamily="18" charset="0"/>
-                <a:cs typeface="Times New Roman" panose="02020603050405020304" pitchFamily="18" charset="0"/>
-              </a:rPr>
-              <a:t>dụng thư viện pickle để đọc mô hình :</a:t>
+              <a:t>Sử dụng thư viện pickle để đọc mô hình :</a:t>
             </a:r>
           </a:p>
           <a:p>
@@ -9692,7 +9861,7 @@
           <p:cNvPr id="11" name="TextBox 10">
             <a:extLst>
               <a:ext uri="{FF2B5EF4-FFF2-40B4-BE49-F238E27FC236}">
-                <a16:creationId xmlns="" xmlns:a16="http://schemas.microsoft.com/office/drawing/2014/main" id="{D3A0E56C-EB23-403E-85B4-3366C94069E0}"/>
+                <a16:creationId xmlns:a16="http://schemas.microsoft.com/office/drawing/2014/main" xmlns="" id="{D3A0E56C-EB23-403E-85B4-3366C94069E0}"/>
               </a:ext>
             </a:extLst>
           </p:cNvPr>
@@ -9888,6 +10057,9 @@
   <p:clrMapOvr>
     <a:masterClrMapping/>
   </p:clrMapOvr>
+  <p:transition spd="slow">
+    <p:wipe/>
+  </p:transition>
   <p:timing>
     <p:tnLst>
       <p:par>
@@ -9920,7 +10092,7 @@
           <p:cNvPr id="2" name="Title 1">
             <a:extLst>
               <a:ext uri="{FF2B5EF4-FFF2-40B4-BE49-F238E27FC236}">
-                <a16:creationId xmlns="" xmlns:a16="http://schemas.microsoft.com/office/drawing/2014/main" id="{9296360E-A856-4EFA-82BD-65F96B5D4536}"/>
+                <a16:creationId xmlns:a16="http://schemas.microsoft.com/office/drawing/2014/main" xmlns="" id="{9296360E-A856-4EFA-82BD-65F96B5D4536}"/>
               </a:ext>
             </a:extLst>
           </p:cNvPr>
@@ -10033,7 +10205,7 @@
           <p:cNvPr id="11" name="TextBox 10">
             <a:extLst>
               <a:ext uri="{FF2B5EF4-FFF2-40B4-BE49-F238E27FC236}">
-                <a16:creationId xmlns="" xmlns:a16="http://schemas.microsoft.com/office/drawing/2014/main" id="{D3A0E56C-EB23-403E-85B4-3366C94069E0}"/>
+                <a16:creationId xmlns:a16="http://schemas.microsoft.com/office/drawing/2014/main" xmlns="" id="{D3A0E56C-EB23-403E-85B4-3366C94069E0}"/>
               </a:ext>
             </a:extLst>
           </p:cNvPr>
@@ -10229,6 +10401,9 @@
   <p:clrMapOvr>
     <a:masterClrMapping/>
   </p:clrMapOvr>
+  <p:transition spd="slow">
+    <p:wipe/>
+  </p:transition>
   <p:timing>
     <p:tnLst>
       <p:par>

</xml_diff>